<commit_message>
Preferred versions added a.o.
</commit_message>
<xml_diff>
--- a/git_workshop.pptx
+++ b/git_workshop.pptx
@@ -27,6 +27,8 @@
     <p:sldId id="274" r:id="rId21"/>
     <p:sldId id="273" r:id="rId22"/>
     <p:sldId id="277" r:id="rId23"/>
+    <p:sldId id="278" r:id="rId24"/>
+    <p:sldId id="279" r:id="rId25"/>
   </p:sldIdLst>
   <p:sldSz cx="9144000" cy="6858000" type="screen4x3"/>
   <p:notesSz cx="6858000" cy="9144000"/>
@@ -310,7 +312,7 @@
             <a:fld id="{8638F0FA-503B-447F-A02E-6BF1D880434F}" type="datetimeFigureOut">
               <a:rPr lang="nl-NL" smtClean="0"/>
               <a:pPr/>
-              <a:t>31-7-2018</a:t>
+              <a:t>3-9-2018</a:t>
             </a:fld>
             <a:endParaRPr lang="nl-NL"/>
           </a:p>
@@ -477,7 +479,7 @@
             <a:fld id="{8638F0FA-503B-447F-A02E-6BF1D880434F}" type="datetimeFigureOut">
               <a:rPr lang="nl-NL" smtClean="0"/>
               <a:pPr/>
-              <a:t>31-7-2018</a:t>
+              <a:t>3-9-2018</a:t>
             </a:fld>
             <a:endParaRPr lang="nl-NL"/>
           </a:p>
@@ -654,7 +656,7 @@
             <a:fld id="{8638F0FA-503B-447F-A02E-6BF1D880434F}" type="datetimeFigureOut">
               <a:rPr lang="nl-NL" smtClean="0"/>
               <a:pPr/>
-              <a:t>31-7-2018</a:t>
+              <a:t>3-9-2018</a:t>
             </a:fld>
             <a:endParaRPr lang="nl-NL"/>
           </a:p>
@@ -821,7 +823,7 @@
             <a:fld id="{8638F0FA-503B-447F-A02E-6BF1D880434F}" type="datetimeFigureOut">
               <a:rPr lang="nl-NL" smtClean="0"/>
               <a:pPr/>
-              <a:t>31-7-2018</a:t>
+              <a:t>3-9-2018</a:t>
             </a:fld>
             <a:endParaRPr lang="nl-NL"/>
           </a:p>
@@ -1064,7 +1066,7 @@
             <a:fld id="{8638F0FA-503B-447F-A02E-6BF1D880434F}" type="datetimeFigureOut">
               <a:rPr lang="nl-NL" smtClean="0"/>
               <a:pPr/>
-              <a:t>31-7-2018</a:t>
+              <a:t>3-9-2018</a:t>
             </a:fld>
             <a:endParaRPr lang="nl-NL"/>
           </a:p>
@@ -1349,7 +1351,7 @@
             <a:fld id="{8638F0FA-503B-447F-A02E-6BF1D880434F}" type="datetimeFigureOut">
               <a:rPr lang="nl-NL" smtClean="0"/>
               <a:pPr/>
-              <a:t>31-7-2018</a:t>
+              <a:t>3-9-2018</a:t>
             </a:fld>
             <a:endParaRPr lang="nl-NL"/>
           </a:p>
@@ -1768,7 +1770,7 @@
             <a:fld id="{8638F0FA-503B-447F-A02E-6BF1D880434F}" type="datetimeFigureOut">
               <a:rPr lang="nl-NL" smtClean="0"/>
               <a:pPr/>
-              <a:t>31-7-2018</a:t>
+              <a:t>3-9-2018</a:t>
             </a:fld>
             <a:endParaRPr lang="nl-NL"/>
           </a:p>
@@ -1883,7 +1885,7 @@
             <a:fld id="{8638F0FA-503B-447F-A02E-6BF1D880434F}" type="datetimeFigureOut">
               <a:rPr lang="nl-NL" smtClean="0"/>
               <a:pPr/>
-              <a:t>31-7-2018</a:t>
+              <a:t>3-9-2018</a:t>
             </a:fld>
             <a:endParaRPr lang="nl-NL"/>
           </a:p>
@@ -1975,7 +1977,7 @@
             <a:fld id="{8638F0FA-503B-447F-A02E-6BF1D880434F}" type="datetimeFigureOut">
               <a:rPr lang="nl-NL" smtClean="0"/>
               <a:pPr/>
-              <a:t>31-7-2018</a:t>
+              <a:t>3-9-2018</a:t>
             </a:fld>
             <a:endParaRPr lang="nl-NL"/>
           </a:p>
@@ -2249,7 +2251,7 @@
             <a:fld id="{8638F0FA-503B-447F-A02E-6BF1D880434F}" type="datetimeFigureOut">
               <a:rPr lang="nl-NL" smtClean="0"/>
               <a:pPr/>
-              <a:t>31-7-2018</a:t>
+              <a:t>3-9-2018</a:t>
             </a:fld>
             <a:endParaRPr lang="nl-NL"/>
           </a:p>
@@ -2499,7 +2501,7 @@
             <a:fld id="{8638F0FA-503B-447F-A02E-6BF1D880434F}" type="datetimeFigureOut">
               <a:rPr lang="nl-NL" smtClean="0"/>
               <a:pPr/>
-              <a:t>31-7-2018</a:t>
+              <a:t>3-9-2018</a:t>
             </a:fld>
             <a:endParaRPr lang="nl-NL"/>
           </a:p>
@@ -2709,7 +2711,7 @@
             <a:fld id="{8638F0FA-503B-447F-A02E-6BF1D880434F}" type="datetimeFigureOut">
               <a:rPr lang="nl-NL" smtClean="0"/>
               <a:pPr/>
-              <a:t>31-7-2018</a:t>
+              <a:t>3-9-2018</a:t>
             </a:fld>
             <a:endParaRPr lang="nl-NL"/>
           </a:p>
@@ -3150,11 +3152,7 @@
           <a:p>
             <a:r>
               <a:rPr lang="en-US" smtClean="0"/>
-              <a:t>Linus Torvalds (creator of Linux) has </a:t>
-            </a:r>
-            <a:r>
-              <a:rPr lang="en-US" smtClean="0"/>
-              <a:t>quipped about the name </a:t>
+              <a:t>Linus Torvalds (creator of Linux) has quipped about the name </a:t>
             </a:r>
             <a:r>
               <a:rPr lang="en-US" i="1" smtClean="0"/>
@@ -3170,15 +3168,24 @@
                   <a:srgbClr val="0070C0"/>
                 </a:solidFill>
               </a:rPr>
-              <a:t>stupid or </a:t>
-            </a:r>
+              <a:t>stupid or unpleasant person.</a:t>
+            </a:r>
+          </a:p>
+          <a:p>
+            <a:endParaRPr lang="en-US" smtClean="0"/>
+          </a:p>
+          <a:p>
             <a:r>
               <a:rPr lang="en-US" smtClean="0">
                 <a:solidFill>
                   <a:srgbClr val="0070C0"/>
                 </a:solidFill>
               </a:rPr>
-              <a:t>unpleasant </a:t>
+              <a:t>Torvalds said: </a:t>
+            </a:r>
+            <a:r>
+              <a:rPr lang="en-US" smtClean="0"/>
+              <a:t>"I'm an egotistical bastard, and </a:t>
             </a:r>
             <a:r>
               <a:rPr lang="en-US" smtClean="0">
@@ -3186,64 +3193,7 @@
                   <a:srgbClr val="0070C0"/>
                 </a:solidFill>
               </a:rPr>
-              <a:t>person.</a:t>
-            </a:r>
-          </a:p>
-          <a:p>
-            <a:endParaRPr lang="en-US" smtClean="0"/>
-          </a:p>
-          <a:p>
-            <a:r>
-              <a:rPr lang="en-US" smtClean="0">
-                <a:solidFill>
-                  <a:srgbClr val="0070C0"/>
-                </a:solidFill>
-              </a:rPr>
-              <a:t>Torvalds </a:t>
-            </a:r>
-            <a:r>
-              <a:rPr lang="en-US" smtClean="0">
-                <a:solidFill>
-                  <a:srgbClr val="0070C0"/>
-                </a:solidFill>
-              </a:rPr>
-              <a:t>said: </a:t>
-            </a:r>
-            <a:r>
-              <a:rPr lang="en-US" smtClean="0"/>
-              <a:t>"I'm an egotistical bastard, and </a:t>
-            </a:r>
-            <a:r>
-              <a:rPr lang="en-US" smtClean="0">
-                <a:solidFill>
-                  <a:srgbClr val="0070C0"/>
-                </a:solidFill>
-              </a:rPr>
-              <a:t>I name all my projects after myself. First 'Linux', now </a:t>
-            </a:r>
-            <a:r>
-              <a:rPr lang="en-US" smtClean="0">
-                <a:solidFill>
-                  <a:srgbClr val="0070C0"/>
-                </a:solidFill>
-              </a:rPr>
-              <a:t>'git</a:t>
-            </a:r>
-            <a:r>
-              <a:rPr lang="en-US" smtClean="0">
-                <a:solidFill>
-                  <a:srgbClr val="0070C0"/>
-                </a:solidFill>
-              </a:rPr>
-              <a:t>'</a:t>
-            </a:r>
-            <a:r>
-              <a:rPr lang="en-US" smtClean="0">
-                <a:solidFill>
-                  <a:srgbClr val="0070C0"/>
-                </a:solidFill>
-              </a:rPr>
-              <a:t> </a:t>
+              <a:t>I name all my projects after myself. First 'Linux', now 'git' </a:t>
             </a:r>
             <a:r>
               <a:rPr lang="en-US" smtClean="0"/>
@@ -3256,31 +3206,7 @@
           <a:p>
             <a:r>
               <a:rPr lang="en-US" smtClean="0"/>
-              <a:t>The </a:t>
-            </a:r>
-            <a:r>
-              <a:rPr lang="en-US" smtClean="0"/>
-              <a:t>man page describes git </a:t>
-            </a:r>
-            <a:r>
-              <a:rPr lang="en-US" smtClean="0"/>
-              <a:t>as </a:t>
-            </a:r>
-            <a:r>
-              <a:rPr lang="en-US" smtClean="0"/>
-              <a:t>"the </a:t>
-            </a:r>
-            <a:r>
-              <a:rPr lang="en-US" smtClean="0"/>
-              <a:t>stupid </a:t>
-            </a:r>
-            <a:r>
-              <a:rPr lang="en-US" smtClean="0"/>
-              <a:t>content </a:t>
-            </a:r>
-            <a:r>
-              <a:rPr lang="en-US" smtClean="0"/>
-              <a:t>tracker".</a:t>
+              <a:t>The man page describes git as "the stupid content tracker".</a:t>
             </a:r>
             <a:endParaRPr lang="en-US"/>
           </a:p>
@@ -3522,11 +3448,7 @@
           <a:p>
             <a:r>
               <a:rPr lang="en-US" sz="2000" smtClean="0"/>
-              <a:t>*.</a:t>
-            </a:r>
-            <a:r>
-              <a:rPr lang="en-US" sz="2000" smtClean="0"/>
-              <a:t>nogit</a:t>
+              <a:t>*.nogit</a:t>
             </a:r>
           </a:p>
           <a:p>
@@ -3610,15 +3532,7 @@
           <a:p>
             <a:r>
               <a:rPr lang="en-US" sz="2000" smtClean="0"/>
-              <a:t>transcrypt/modules/time/__</a:t>
-            </a:r>
-            <a:r>
-              <a:rPr lang="en-US" sz="2000" smtClean="0"/>
-              <a:t>javascript</a:t>
-            </a:r>
-            <a:r>
-              <a:rPr lang="en-US" sz="2000" smtClean="0"/>
-              <a:t>__/</a:t>
+              <a:t>transcrypt/modules/time/__javascript__/</a:t>
             </a:r>
           </a:p>
           <a:p>
@@ -3632,7 +3546,6 @@
               <a:rPr lang="en-US" sz="2000" smtClean="0"/>
               <a:t>...</a:t>
             </a:r>
-            <a:endParaRPr lang="en-US" sz="2000" smtClean="0"/>
           </a:p>
         </p:txBody>
       </p:sp>
@@ -3704,11 +3617,7 @@
           <a:p>
             <a:r>
               <a:rPr lang="en-US" sz="2800" smtClean="0"/>
-              <a:t>git </a:t>
-            </a:r>
-            <a:r>
-              <a:rPr lang="en-US" sz="2800" smtClean="0"/>
-              <a:t>checkout -b develop</a:t>
+              <a:t>git checkout -b develop</a:t>
             </a:r>
           </a:p>
           <a:p>
@@ -3725,26 +3634,11 @@
               </a:rPr>
               <a:t># switch to existing branch</a:t>
             </a:r>
-            <a:endParaRPr lang="en-US" sz="2800" smtClean="0">
-              <a:solidFill>
-                <a:schemeClr val="accent6">
-                  <a:lumMod val="75000"/>
-                </a:schemeClr>
-              </a:solidFill>
-            </a:endParaRPr>
           </a:p>
           <a:p>
             <a:r>
               <a:rPr lang="en-US" sz="2800" smtClean="0"/>
-              <a:t>git </a:t>
-            </a:r>
-            <a:r>
-              <a:rPr lang="en-US" sz="2800" smtClean="0"/>
-              <a:t>checkout </a:t>
-            </a:r>
-            <a:r>
-              <a:rPr lang="en-US" sz="2800" smtClean="0"/>
-              <a:t>develop</a:t>
+              <a:t>git checkout develop</a:t>
             </a:r>
           </a:p>
           <a:p>
@@ -3761,13 +3655,6 @@
               </a:rPr>
               <a:t>(Make local changes, add and commit)</a:t>
             </a:r>
-            <a:endParaRPr lang="en-US" sz="2800" smtClean="0">
-              <a:solidFill>
-                <a:schemeClr val="accent6">
-                  <a:lumMod val="75000"/>
-                </a:schemeClr>
-              </a:solidFill>
-            </a:endParaRPr>
           </a:p>
           <a:p>
             <a:endParaRPr lang="en-US" sz="2800" smtClean="0"/>
@@ -3783,13 +3670,6 @@
               </a:rPr>
               <a:t># upload changes to remote develop branch</a:t>
             </a:r>
-            <a:endParaRPr lang="en-US" sz="2800" smtClean="0">
-              <a:solidFill>
-                <a:schemeClr val="accent6">
-                  <a:lumMod val="75000"/>
-                </a:schemeClr>
-              </a:solidFill>
-            </a:endParaRPr>
           </a:p>
           <a:p>
             <a:r>
@@ -3811,33 +3691,17 @@
               </a:rPr>
               <a:t># show all branches</a:t>
             </a:r>
-            <a:endParaRPr lang="en-US" sz="2800" smtClean="0">
-              <a:solidFill>
-                <a:schemeClr val="accent6">
-                  <a:lumMod val="75000"/>
-                </a:schemeClr>
-              </a:solidFill>
-            </a:endParaRPr>
           </a:p>
           <a:p>
             <a:r>
               <a:rPr lang="en-US" sz="2800" smtClean="0"/>
-              <a:t>git </a:t>
-            </a:r>
+              <a:t>git branch</a:t>
+            </a:r>
+          </a:p>
+          <a:p>
             <a:r>
               <a:rPr lang="en-US" sz="2800" smtClean="0"/>
-              <a:t>branch</a:t>
-            </a:r>
-            <a:endParaRPr lang="en-US" sz="2800" smtClean="0"/>
-          </a:p>
-          <a:p>
-            <a:r>
-              <a:rPr lang="en-US" sz="2800" smtClean="0"/>
-              <a:t>* </a:t>
-            </a:r>
-            <a:r>
-              <a:rPr lang="en-US" sz="2800" smtClean="0"/>
-              <a:t>develop               </a:t>
+              <a:t>* develop               </a:t>
             </a:r>
             <a:r>
               <a:rPr lang="en-US" sz="2800" smtClean="0">
@@ -3861,11 +3725,7 @@
           <a:p>
             <a:r>
               <a:rPr lang="en-US" sz="2800" smtClean="0"/>
-              <a:t>  </a:t>
-            </a:r>
-            <a:r>
-              <a:rPr lang="en-US" sz="2800" smtClean="0"/>
-              <a:t> master</a:t>
+              <a:t>   master</a:t>
             </a:r>
             <a:r>
               <a:rPr lang="en-US" smtClean="0"/>
@@ -4646,6 +4506,36 @@
           </a:ln>
         </p:spPr>
       </p:pic>
+      <p:sp>
+        <p:nvSpPr>
+          <p:cNvPr id="5" name="Tekstvak 4"/>
+          <p:cNvSpPr txBox="1"/>
+          <p:nvPr/>
+        </p:nvSpPr>
+        <p:spPr>
+          <a:xfrm>
+            <a:off x="2699792" y="476672"/>
+            <a:ext cx="3767955" cy="369332"/>
+          </a:xfrm>
+          <a:prstGeom prst="rect">
+            <a:avLst/>
+          </a:prstGeom>
+          <a:noFill/>
+        </p:spPr>
+        <p:txBody>
+          <a:bodyPr wrap="none" rtlCol="0">
+            <a:spAutoFit/>
+          </a:bodyPr>
+          <a:lstStyle/>
+          <a:p>
+            <a:r>
+              <a:rPr lang="en-US" smtClean="0"/>
+              <a:t>Second line of defense: offline storage</a:t>
+            </a:r>
+            <a:endParaRPr lang="en-US"/>
+          </a:p>
+        </p:txBody>
+      </p:sp>
     </p:spTree>
   </p:cSld>
   <p:clrMapOvr>
@@ -4710,6 +4600,36 @@
           </a:ln>
         </p:spPr>
       </p:pic>
+      <p:sp>
+        <p:nvSpPr>
+          <p:cNvPr id="3" name="Tekstvak 2"/>
+          <p:cNvSpPr txBox="1"/>
+          <p:nvPr/>
+        </p:nvSpPr>
+        <p:spPr>
+          <a:xfrm>
+            <a:off x="3131840" y="476672"/>
+            <a:ext cx="2873928" cy="369332"/>
+          </a:xfrm>
+          <a:prstGeom prst="rect">
+            <a:avLst/>
+          </a:prstGeom>
+          <a:noFill/>
+        </p:spPr>
+        <p:txBody>
+          <a:bodyPr wrap="none" rtlCol="0">
+            <a:spAutoFit/>
+          </a:bodyPr>
+          <a:lstStyle/>
+          <a:p>
+            <a:r>
+              <a:rPr lang="en-US" smtClean="0"/>
+              <a:t>Keep it simple (and sortable)</a:t>
+            </a:r>
+            <a:endParaRPr lang="en-US"/>
+          </a:p>
+        </p:txBody>
+      </p:sp>
     </p:spTree>
   </p:cSld>
   <p:clrMapOvr>
@@ -4768,6 +4688,36 @@
           <a:noFill/>
         </p:spPr>
       </p:pic>
+      <p:sp>
+        <p:nvSpPr>
+          <p:cNvPr id="3" name="Tekstvak 2"/>
+          <p:cNvSpPr txBox="1"/>
+          <p:nvPr/>
+        </p:nvSpPr>
+        <p:spPr>
+          <a:xfrm>
+            <a:off x="2267744" y="476672"/>
+            <a:ext cx="4600427" cy="369332"/>
+          </a:xfrm>
+          <a:prstGeom prst="rect">
+            <a:avLst/>
+          </a:prstGeom>
+          <a:noFill/>
+        </p:spPr>
+        <p:txBody>
+          <a:bodyPr wrap="none" rtlCol="0">
+            <a:spAutoFit/>
+          </a:bodyPr>
+          <a:lstStyle/>
+          <a:p>
+            <a:r>
+              <a:rPr lang="en-US" smtClean="0"/>
+              <a:t>Beat systematical errors by chaotic redundancy</a:t>
+            </a:r>
+            <a:endParaRPr lang="en-US"/>
+          </a:p>
+        </p:txBody>
+      </p:sp>
     </p:spTree>
   </p:cSld>
   <p:clrMapOvr>
@@ -4780,6 +4730,347 @@
       </p:par>
     </p:tnLst>
   </p:timing>
+</p:sld>
+</file>
+
+<file path=ppt/slides/slide23.xml><?xml version="1.0" encoding="utf-8"?>
+<p:sld xmlns:a="http://schemas.openxmlformats.org/drawingml/2006/main" xmlns:r="http://schemas.openxmlformats.org/officeDocument/2006/relationships" xmlns:p="http://schemas.openxmlformats.org/presentationml/2006/main">
+  <p:cSld>
+    <p:spTree>
+      <p:nvGrpSpPr>
+        <p:cNvPr id="1" name=""/>
+        <p:cNvGrpSpPr/>
+        <p:nvPr/>
+      </p:nvGrpSpPr>
+      <p:grpSpPr>
+        <a:xfrm>
+          <a:off x="0" y="0"/>
+          <a:ext cx="0" cy="0"/>
+          <a:chOff x="0" y="0"/>
+          <a:chExt cx="0" cy="0"/>
+        </a:xfrm>
+      </p:grpSpPr>
+      <p:sp>
+        <p:nvSpPr>
+          <p:cNvPr id="2" name="Titel 1"/>
+          <p:cNvSpPr>
+            <a:spLocks noGrp="1"/>
+          </p:cNvSpPr>
+          <p:nvPr>
+            <p:ph type="title"/>
+          </p:nvPr>
+        </p:nvSpPr>
+        <p:spPr>
+          <a:xfrm>
+            <a:off x="467544" y="0"/>
+            <a:ext cx="8229600" cy="778098"/>
+          </a:xfrm>
+        </p:spPr>
+        <p:txBody>
+          <a:bodyPr>
+            <a:normAutofit/>
+          </a:bodyPr>
+          <a:lstStyle/>
+          <a:p>
+            <a:r>
+              <a:rPr lang="en-US" smtClean="0"/>
+              <a:t>GIT essentials</a:t>
+            </a:r>
+            <a:endParaRPr lang="en-US"/>
+          </a:p>
+        </p:txBody>
+      </p:sp>
+      <p:sp>
+        <p:nvSpPr>
+          <p:cNvPr id="3" name="Tijdelijke aanduiding voor inhoud 2"/>
+          <p:cNvSpPr>
+            <a:spLocks noGrp="1"/>
+          </p:cNvSpPr>
+          <p:nvPr>
+            <p:ph idx="1"/>
+          </p:nvPr>
+        </p:nvSpPr>
+        <p:spPr>
+          <a:xfrm>
+            <a:off x="0" y="764704"/>
+            <a:ext cx="9144000" cy="5832648"/>
+          </a:xfrm>
+        </p:spPr>
+        <p:txBody>
+          <a:bodyPr>
+            <a:normAutofit/>
+          </a:bodyPr>
+          <a:lstStyle/>
+          <a:p>
+            <a:r>
+              <a:rPr lang="en-US" sz="2400" smtClean="0">
+                <a:hlinkClick r:id="rId2"/>
+              </a:rPr>
+              <a:t>understanding git</a:t>
+            </a:r>
+            <a:endParaRPr lang="en-US" sz="2400" smtClean="0"/>
+          </a:p>
+          <a:p>
+            <a:r>
+              <a:rPr lang="en-US" sz="2400" smtClean="0">
+                <a:hlinkClick r:id="rId3"/>
+              </a:rPr>
+              <a:t>understanding git 2</a:t>
+            </a:r>
+            <a:endParaRPr lang="en-US" sz="2400" smtClean="0"/>
+          </a:p>
+          <a:p>
+            <a:r>
+              <a:rPr lang="en-US" sz="2400" smtClean="0">
+                <a:hlinkClick r:id="rId4"/>
+              </a:rPr>
+              <a:t>a successful git branching model</a:t>
+            </a:r>
+            <a:endParaRPr lang="en-US" sz="2400" smtClean="0"/>
+          </a:p>
+          <a:p>
+            <a:r>
+              <a:rPr lang="en-US" sz="2400" smtClean="0">
+                <a:hlinkClick r:id="rId5"/>
+              </a:rPr>
+              <a:t>turn feature branch into master</a:t>
+            </a:r>
+            <a:endParaRPr lang="en-US" sz="2400" smtClean="0"/>
+          </a:p>
+          <a:p>
+            <a:r>
+              <a:rPr lang="en-US" sz="2400" smtClean="0">
+                <a:hlinkClick r:id="rId6"/>
+              </a:rPr>
+              <a:t>merge specific files from other branch</a:t>
+            </a:r>
+            <a:endParaRPr lang="en-US" sz="2400" smtClean="0"/>
+          </a:p>
+          <a:p>
+            <a:r>
+              <a:rPr lang="en-US" sz="2400" smtClean="0">
+                <a:hlinkClick r:id="rId7"/>
+              </a:rPr>
+              <a:t>remove files that are listed in .gitignore</a:t>
+            </a:r>
+            <a:endParaRPr lang="en-US" sz="2400" smtClean="0"/>
+          </a:p>
+          <a:p>
+            <a:r>
+              <a:rPr lang="en-US" sz="2400" smtClean="0">
+                <a:hlinkClick r:id="rId8"/>
+              </a:rPr>
+              <a:t>git for computer scientists</a:t>
+            </a:r>
+            <a:endParaRPr lang="en-US" sz="2400" smtClean="0"/>
+          </a:p>
+          <a:p>
+            <a:endParaRPr lang="en-US" sz="2400" smtClean="0"/>
+          </a:p>
+          <a:p>
+            <a:pPr>
+              <a:buNone/>
+            </a:pPr>
+            <a:endParaRPr lang="en-US" smtClean="0"/>
+          </a:p>
+          <a:p>
+            <a:pPr>
+              <a:buNone/>
+            </a:pPr>
+            <a:endParaRPr lang="en-US" smtClean="0"/>
+          </a:p>
+          <a:p>
+            <a:pPr>
+              <a:buNone/>
+            </a:pPr>
+            <a:endParaRPr lang="en-US" smtClean="0"/>
+          </a:p>
+          <a:p>
+            <a:pPr>
+              <a:buNone/>
+            </a:pPr>
+            <a:endParaRPr lang="en-US" smtClean="0"/>
+          </a:p>
+          <a:p>
+            <a:pPr>
+              <a:buNone/>
+            </a:pPr>
+            <a:endParaRPr lang="en-US" smtClean="0"/>
+          </a:p>
+          <a:p>
+            <a:endParaRPr lang="en-US"/>
+          </a:p>
+        </p:txBody>
+      </p:sp>
+    </p:spTree>
+  </p:cSld>
+  <p:clrMapOvr>
+    <a:masterClrMapping/>
+  </p:clrMapOvr>
+  <p:timing>
+    <p:tnLst>
+      <p:par>
+        <p:cTn id="1" dur="indefinite" restart="never" nodeType="tmRoot"/>
+      </p:par>
+    </p:tnLst>
+  </p:timing>
+</p:sld>
+</file>
+
+<file path=ppt/slides/slide24.xml><?xml version="1.0" encoding="utf-8"?>
+<p:sld xmlns:a="http://schemas.openxmlformats.org/drawingml/2006/main" xmlns:r="http://schemas.openxmlformats.org/officeDocument/2006/relationships" xmlns:p="http://schemas.openxmlformats.org/presentationml/2006/main">
+  <p:cSld>
+    <p:spTree>
+      <p:nvGrpSpPr>
+        <p:cNvPr id="1" name=""/>
+        <p:cNvGrpSpPr/>
+        <p:nvPr/>
+      </p:nvGrpSpPr>
+      <p:grpSpPr>
+        <a:xfrm>
+          <a:off x="0" y="0"/>
+          <a:ext cx="0" cy="0"/>
+          <a:chOff x="0" y="0"/>
+          <a:chExt cx="0" cy="0"/>
+        </a:xfrm>
+      </p:grpSpPr>
+      <p:sp>
+        <p:nvSpPr>
+          <p:cNvPr id="2" name="Titel 1"/>
+          <p:cNvSpPr>
+            <a:spLocks noGrp="1"/>
+          </p:cNvSpPr>
+          <p:nvPr>
+            <p:ph type="title"/>
+          </p:nvPr>
+        </p:nvSpPr>
+        <p:spPr/>
+        <p:txBody>
+          <a:bodyPr>
+            <a:normAutofit fontScale="90000"/>
+          </a:bodyPr>
+          <a:lstStyle/>
+          <a:p>
+            <a:r>
+              <a:rPr lang="en-US" smtClean="0"/>
+              <a:t>On the HR, for optimal support use:</a:t>
+            </a:r>
+            <a:endParaRPr lang="en-US"/>
+          </a:p>
+        </p:txBody>
+      </p:sp>
+      <p:sp>
+        <p:nvSpPr>
+          <p:cNvPr id="3" name="Tijdelijke aanduiding voor inhoud 2"/>
+          <p:cNvSpPr>
+            <a:spLocks noGrp="1"/>
+          </p:cNvSpPr>
+          <p:nvPr>
+            <p:ph idx="1"/>
+          </p:nvPr>
+        </p:nvSpPr>
+        <p:spPr>
+          <a:xfrm>
+            <a:off x="457200" y="2132857"/>
+            <a:ext cx="8229600" cy="3312368"/>
+          </a:xfrm>
+        </p:spPr>
+        <p:txBody>
+          <a:bodyPr>
+            <a:normAutofit/>
+          </a:bodyPr>
+          <a:lstStyle/>
+          <a:p>
+            <a:r>
+              <a:rPr lang="nl-NL" smtClean="0"/>
+              <a:t>Git 2.18.0</a:t>
+            </a:r>
+          </a:p>
+          <a:p>
+            <a:r>
+              <a:rPr lang="nl-NL" smtClean="0"/>
+              <a:t>VS </a:t>
+            </a:r>
+            <a:r>
+              <a:rPr lang="nl-NL" smtClean="0"/>
+              <a:t>Code </a:t>
+            </a:r>
+            <a:r>
+              <a:rPr lang="nl-NL" smtClean="0"/>
+              <a:t>1.26.1</a:t>
+            </a:r>
+            <a:endParaRPr lang="nl-NL" smtClean="0"/>
+          </a:p>
+          <a:p>
+            <a:r>
+              <a:rPr lang="nl-NL" smtClean="0"/>
+              <a:t>Arduino </a:t>
+            </a:r>
+            <a:r>
+              <a:rPr lang="nl-NL" smtClean="0"/>
+              <a:t>IDE </a:t>
+            </a:r>
+            <a:r>
+              <a:rPr lang="nl-NL" smtClean="0"/>
+              <a:t>1.8.6 </a:t>
+            </a:r>
+          </a:p>
+          <a:p>
+            <a:r>
+              <a:rPr lang="nl-NL" smtClean="0"/>
+              <a:t>Classroom </a:t>
+            </a:r>
+            <a:r>
+              <a:rPr lang="nl-NL" smtClean="0"/>
+              <a:t>/ </a:t>
+            </a:r>
+            <a:r>
+              <a:rPr lang="nl-NL" smtClean="0"/>
+              <a:t>persoonlijke website</a:t>
+            </a:r>
+            <a:r>
+              <a:rPr lang="nl-NL" smtClean="0"/>
+              <a:t>.</a:t>
+            </a:r>
+          </a:p>
+          <a:p>
+            <a:r>
+              <a:rPr lang="nl-NL" smtClean="0"/>
+              <a:t>HR CMI GitLab server: </a:t>
+            </a:r>
+            <a:r>
+              <a:rPr lang="nl-NL" smtClean="0">
+                <a:hlinkClick r:id="rId2"/>
+              </a:rPr>
+              <a:t>http</a:t>
+            </a:r>
+            <a:r>
+              <a:rPr lang="nl-NL" smtClean="0">
+                <a:hlinkClick r:id="rId2"/>
+              </a:rPr>
+              <a:t>://</a:t>
+            </a:r>
+            <a:r>
+              <a:rPr lang="nl-NL" smtClean="0">
+                <a:hlinkClick r:id="rId2"/>
+              </a:rPr>
+              <a:t>gitlab.cmi.hr.nl</a:t>
+            </a:r>
+            <a:endParaRPr lang="nl-NL" smtClean="0"/>
+          </a:p>
+          <a:p>
+            <a:pPr>
+              <a:buNone/>
+            </a:pPr>
+            <a:endParaRPr lang="en-US"/>
+          </a:p>
+        </p:txBody>
+      </p:sp>
+    </p:spTree>
+  </p:cSld>
+  <p:clrMapOvr>
+    <a:masterClrMapping/>
+  </p:clrMapOvr>
 </p:sld>
 </file>
 
@@ -4888,32 +5179,16 @@
           <a:p>
             <a:r>
               <a:rPr lang="en-US" sz="2400" smtClean="0"/>
-              <a:t>git config --global </a:t>
-            </a:r>
+              <a:t>git config --global user.name "Jacques de Hooge"</a:t>
+            </a:r>
+          </a:p>
+          <a:p>
+            <a:endParaRPr lang="en-US" sz="2400" smtClean="0"/>
+          </a:p>
+          <a:p>
             <a:r>
               <a:rPr lang="en-US" sz="2400" smtClean="0"/>
-              <a:t>user.name </a:t>
-            </a:r>
-            <a:r>
-              <a:rPr lang="en-US" sz="2400" smtClean="0"/>
-              <a:t>"Jacques de Hooge"</a:t>
-            </a:r>
-          </a:p>
-          <a:p>
-            <a:endParaRPr lang="en-US" sz="2400" smtClean="0"/>
-          </a:p>
-          <a:p>
-            <a:r>
-              <a:rPr lang="en-US" sz="2400" smtClean="0"/>
-              <a:t>git config --</a:t>
-            </a:r>
-            <a:r>
-              <a:rPr lang="en-US" sz="2400" smtClean="0"/>
-              <a:t>global </a:t>
-            </a:r>
-            <a:r>
-              <a:rPr lang="en-US" sz="2400" smtClean="0"/>
-              <a:t>user.email jdeh@transcrypt.org</a:t>
+              <a:t>git config --global user.email jdeh@transcrypt.org</a:t>
             </a:r>
             <a:endParaRPr lang="en-US" smtClean="0"/>
           </a:p>
@@ -5124,19 +5399,7 @@
           <a:p>
             <a:r>
               <a:rPr lang="en-US" sz="2800" smtClean="0"/>
-              <a:t>git </a:t>
-            </a:r>
-            <a:r>
-              <a:rPr lang="en-US" sz="2800" smtClean="0"/>
-              <a:t>clone </a:t>
-            </a:r>
-            <a:r>
-              <a:rPr lang="en-US" sz="2800" smtClean="0"/>
-              <a:t>://</a:t>
-            </a:r>
-            <a:r>
-              <a:rPr lang="en-US" sz="2800" smtClean="0"/>
-              <a:t>github.com/QQuick/Transcrypt.git</a:t>
+              <a:t>git clone ://github.com/QQuick/Transcrypt.git</a:t>
             </a:r>
           </a:p>
           <a:p>
@@ -5205,7 +5468,11 @@
                   </a:schemeClr>
                 </a:solidFill>
               </a:rPr>
-              <a:t># add </a:t>
+              <a:t># add file to the staging area (</a:t>
+            </a:r>
+            <a:r>
+              <a:rPr lang="en-US" sz="2400" smtClean="0"/>
+              <a:t>git add . </a:t>
             </a:r>
             <a:r>
               <a:rPr lang="en-US" sz="2400" smtClean="0">
@@ -5215,8 +5482,19 @@
                   </a:schemeClr>
                 </a:solidFill>
               </a:rPr>
-              <a:t>file to the </a:t>
-            </a:r>
+              <a:t>adds everything)</a:t>
+            </a:r>
+          </a:p>
+          <a:p>
+            <a:r>
+              <a:rPr lang="en-US" sz="2400" smtClean="0"/>
+              <a:t>git add modules.py</a:t>
+            </a:r>
+          </a:p>
+          <a:p>
+            <a:endParaRPr lang="en-US" sz="2400" smtClean="0"/>
+          </a:p>
+          <a:p>
             <a:r>
               <a:rPr lang="en-US" sz="2400" smtClean="0">
                 <a:solidFill>
@@ -5225,8 +5503,19 @@
                   </a:schemeClr>
                 </a:solidFill>
               </a:rPr>
-              <a:t>staging </a:t>
-            </a:r>
+              <a:t># first commit</a:t>
+            </a:r>
+          </a:p>
+          <a:p>
+            <a:r>
+              <a:rPr lang="en-US" sz="2400" smtClean="0"/>
+              <a:t>git commit –m“added module support"</a:t>
+            </a:r>
+          </a:p>
+          <a:p>
+            <a:endParaRPr lang="en-US" sz="2400" smtClean="0"/>
+          </a:p>
+          <a:p>
             <a:r>
               <a:rPr lang="en-US" sz="2400" smtClean="0">
                 <a:solidFill>
@@ -5235,165 +5524,14 @@
                   </a:schemeClr>
                 </a:solidFill>
               </a:rPr>
-              <a:t>area (</a:t>
-            </a:r>
+              <a:t># add file to the staging area</a:t>
+            </a:r>
+          </a:p>
+          <a:p>
             <a:r>
               <a:rPr lang="en-US" sz="2400" smtClean="0"/>
-              <a:t>git add . </a:t>
-            </a:r>
-            <a:r>
-              <a:rPr lang="en-US" sz="2400" smtClean="0">
-                <a:solidFill>
-                  <a:schemeClr val="accent6">
-                    <a:lumMod val="75000"/>
-                  </a:schemeClr>
-                </a:solidFill>
-              </a:rPr>
-              <a:t>adds </a:t>
-            </a:r>
-            <a:r>
-              <a:rPr lang="en-US" sz="2400" smtClean="0">
-                <a:solidFill>
-                  <a:schemeClr val="accent6">
-                    <a:lumMod val="75000"/>
-                  </a:schemeClr>
-                </a:solidFill>
-              </a:rPr>
-              <a:t>everything</a:t>
-            </a:r>
-            <a:r>
-              <a:rPr lang="en-US" sz="2400" smtClean="0">
-                <a:solidFill>
-                  <a:schemeClr val="accent6">
-                    <a:lumMod val="75000"/>
-                  </a:schemeClr>
-                </a:solidFill>
-              </a:rPr>
-              <a:t>)</a:t>
-            </a:r>
-            <a:endParaRPr lang="en-US" sz="2400" smtClean="0">
-              <a:solidFill>
-                <a:schemeClr val="accent6">
-                  <a:lumMod val="75000"/>
-                </a:schemeClr>
-              </a:solidFill>
-            </a:endParaRPr>
-          </a:p>
-          <a:p>
-            <a:r>
-              <a:rPr lang="en-US" sz="2400" smtClean="0"/>
-              <a:t>git </a:t>
-            </a:r>
-            <a:r>
-              <a:rPr lang="en-US" sz="2400" smtClean="0"/>
-              <a:t>add </a:t>
-            </a:r>
-            <a:r>
-              <a:rPr lang="en-US" sz="2400" smtClean="0"/>
-              <a:t>modules.py</a:t>
-            </a:r>
-            <a:endParaRPr lang="en-US" sz="2400" smtClean="0"/>
-          </a:p>
-          <a:p>
-            <a:endParaRPr lang="en-US" sz="2400" smtClean="0"/>
-          </a:p>
-          <a:p>
-            <a:r>
-              <a:rPr lang="en-US" sz="2400" smtClean="0">
-                <a:solidFill>
-                  <a:schemeClr val="accent6">
-                    <a:lumMod val="75000"/>
-                  </a:schemeClr>
-                </a:solidFill>
-              </a:rPr>
-              <a:t># </a:t>
-            </a:r>
-            <a:r>
-              <a:rPr lang="en-US" sz="2400" smtClean="0">
-                <a:solidFill>
-                  <a:schemeClr val="accent6">
-                    <a:lumMod val="75000"/>
-                  </a:schemeClr>
-                </a:solidFill>
-              </a:rPr>
-              <a:t>first commit</a:t>
-            </a:r>
-            <a:endParaRPr lang="en-US" sz="2400" smtClean="0">
-              <a:solidFill>
-                <a:schemeClr val="accent6">
-                  <a:lumMod val="75000"/>
-                </a:schemeClr>
-              </a:solidFill>
-            </a:endParaRPr>
-          </a:p>
-          <a:p>
-            <a:r>
-              <a:rPr lang="en-US" sz="2400" smtClean="0"/>
-              <a:t>git </a:t>
-            </a:r>
-            <a:r>
-              <a:rPr lang="en-US" sz="2400" smtClean="0"/>
-              <a:t>commit </a:t>
-            </a:r>
-            <a:r>
-              <a:rPr lang="en-US" sz="2400" smtClean="0"/>
-              <a:t>–</a:t>
-            </a:r>
-            <a:r>
-              <a:rPr lang="en-US" sz="2400" smtClean="0"/>
-              <a:t>m“added module support"</a:t>
-            </a:r>
-            <a:endParaRPr lang="en-US" sz="2400" smtClean="0"/>
-          </a:p>
-          <a:p>
-            <a:endParaRPr lang="en-US" sz="2400" smtClean="0"/>
-          </a:p>
-          <a:p>
-            <a:r>
-              <a:rPr lang="en-US" sz="2400" smtClean="0">
-                <a:solidFill>
-                  <a:schemeClr val="accent6">
-                    <a:lumMod val="75000"/>
-                  </a:schemeClr>
-                </a:solidFill>
-              </a:rPr>
-              <a:t># </a:t>
-            </a:r>
-            <a:r>
-              <a:rPr lang="en-US" sz="2400" smtClean="0">
-                <a:solidFill>
-                  <a:schemeClr val="accent6">
-                    <a:lumMod val="75000"/>
-                  </a:schemeClr>
-                </a:solidFill>
-              </a:rPr>
-              <a:t>add </a:t>
-            </a:r>
-            <a:r>
-              <a:rPr lang="en-US" sz="2400" smtClean="0">
-                <a:solidFill>
-                  <a:schemeClr val="accent6">
-                    <a:lumMod val="75000"/>
-                  </a:schemeClr>
-                </a:solidFill>
-              </a:rPr>
-              <a:t>file to the staging area</a:t>
-            </a:r>
-          </a:p>
-          <a:p>
-            <a:r>
-              <a:rPr lang="en-US" sz="2400" smtClean="0"/>
-              <a:t>git </a:t>
-            </a:r>
-            <a:r>
-              <a:rPr lang="en-US" sz="2400" smtClean="0"/>
-              <a:t>add </a:t>
-            </a:r>
-            <a:r>
-              <a:rPr lang="en-US" sz="2400" smtClean="0"/>
-              <a:t>sourcemaps.py</a:t>
-            </a:r>
-            <a:endParaRPr lang="en-US" sz="2400" smtClean="0"/>
+              <a:t>git add sourcemaps.py</a:t>
+            </a:r>
           </a:p>
           <a:p>
             <a:endParaRPr lang="en-US" sz="2400" smtClean="0"/>
@@ -5409,30 +5547,11 @@
               </a:rPr>
               <a:t># second commit</a:t>
             </a:r>
-            <a:endParaRPr lang="en-US" sz="2400" smtClean="0">
-              <a:solidFill>
-                <a:schemeClr val="accent6">
-                  <a:lumMod val="75000"/>
-                </a:schemeClr>
-              </a:solidFill>
-            </a:endParaRPr>
           </a:p>
           <a:p>
             <a:r>
               <a:rPr lang="en-US" sz="2400" smtClean="0"/>
-              <a:t>git </a:t>
-            </a:r>
-            <a:r>
-              <a:rPr lang="en-US" sz="2400" smtClean="0"/>
-              <a:t>commit </a:t>
-            </a:r>
-            <a:r>
-              <a:rPr lang="en-US" sz="2400" smtClean="0"/>
-              <a:t>–</a:t>
-            </a:r>
-            <a:r>
-              <a:rPr lang="en-US" sz="2400" smtClean="0"/>
-              <a:t>m“added sourcemaps“</a:t>
+              <a:t>git commit –m“added sourcemaps“</a:t>
             </a:r>
           </a:p>
           <a:p>

</xml_diff>

<commit_message>
GitLab upload instructions added
</commit_message>
<xml_diff>
--- a/git_workshop.pptx
+++ b/git_workshop.pptx
@@ -29,6 +29,7 @@
     <p:sldId id="277" r:id="rId23"/>
     <p:sldId id="278" r:id="rId24"/>
     <p:sldId id="279" r:id="rId25"/>
+    <p:sldId id="280" r:id="rId26"/>
   </p:sldIdLst>
   <p:sldSz cx="9144000" cy="6858000" type="screen4x3"/>
   <p:notesSz cx="6858000" cy="9144000"/>
@@ -5030,6 +5031,206 @@
   <p:clrMapOvr>
     <a:masterClrMapping/>
   </p:clrMapOvr>
+  <p:timing>
+    <p:tnLst>
+      <p:par>
+        <p:cTn id="1" dur="indefinite" restart="never" nodeType="tmRoot"/>
+      </p:par>
+    </p:tnLst>
+  </p:timing>
+</p:sld>
+</file>
+
+<file path=ppt/slides/slide25.xml><?xml version="1.0" encoding="utf-8"?>
+<p:sld xmlns:a="http://schemas.openxmlformats.org/drawingml/2006/main" xmlns:r="http://schemas.openxmlformats.org/officeDocument/2006/relationships" xmlns:p="http://schemas.openxmlformats.org/presentationml/2006/main">
+  <p:cSld>
+    <p:spTree>
+      <p:nvGrpSpPr>
+        <p:cNvPr id="1" name=""/>
+        <p:cNvGrpSpPr/>
+        <p:nvPr/>
+      </p:nvGrpSpPr>
+      <p:grpSpPr>
+        <a:xfrm>
+          <a:off x="0" y="0"/>
+          <a:ext cx="0" cy="0"/>
+          <a:chOff x="0" y="0"/>
+          <a:chExt cx="0" cy="0"/>
+        </a:xfrm>
+      </p:grpSpPr>
+      <p:sp>
+        <p:nvSpPr>
+          <p:cNvPr id="2" name="Titel 1"/>
+          <p:cNvSpPr>
+            <a:spLocks noGrp="1"/>
+          </p:cNvSpPr>
+          <p:nvPr>
+            <p:ph type="title"/>
+          </p:nvPr>
+        </p:nvSpPr>
+        <p:spPr/>
+        <p:txBody>
+          <a:bodyPr>
+            <a:normAutofit fontScale="90000"/>
+          </a:bodyPr>
+          <a:lstStyle/>
+          <a:p>
+            <a:r>
+              <a:rPr lang="en-US" smtClean="0"/>
+              <a:t>Lokaal project uploaden naar GitLab</a:t>
+            </a:r>
+            <a:endParaRPr lang="en-US"/>
+          </a:p>
+        </p:txBody>
+      </p:sp>
+      <p:sp>
+        <p:nvSpPr>
+          <p:cNvPr id="3" name="Tijdelijke aanduiding voor inhoud 2"/>
+          <p:cNvSpPr>
+            <a:spLocks noGrp="1"/>
+          </p:cNvSpPr>
+          <p:nvPr>
+            <p:ph idx="1"/>
+          </p:nvPr>
+        </p:nvSpPr>
+        <p:spPr>
+          <a:xfrm>
+            <a:off x="107504" y="1600200"/>
+            <a:ext cx="9036496" cy="4525963"/>
+          </a:xfrm>
+        </p:spPr>
+        <p:txBody>
+          <a:bodyPr/>
+          <a:lstStyle/>
+          <a:p>
+            <a:pPr>
+              <a:buNone/>
+            </a:pPr>
+            <a:r>
+              <a:rPr lang="en-US" sz="2800" b="1" smtClean="0"/>
+              <a:t>First create a new project on GitLab and then:</a:t>
+            </a:r>
+          </a:p>
+          <a:p>
+            <a:pPr>
+              <a:buNone/>
+            </a:pPr>
+            <a:endParaRPr lang="en-US" sz="2800" smtClean="0"/>
+          </a:p>
+          <a:p>
+            <a:pPr>
+              <a:buNone/>
+            </a:pPr>
+            <a:r>
+              <a:rPr lang="en-US" sz="2800" smtClean="0"/>
+              <a:t>git </a:t>
+            </a:r>
+            <a:r>
+              <a:rPr lang="en-US" sz="2800" smtClean="0"/>
+              <a:t>remote </a:t>
+            </a:r>
+            <a:r>
+              <a:rPr lang="en-US" sz="2800" smtClean="0"/>
+              <a:t>add </a:t>
+            </a:r>
+            <a:r>
+              <a:rPr lang="en-US" sz="2800" smtClean="0"/>
+              <a:t>origin</a:t>
+            </a:r>
+          </a:p>
+          <a:p>
+            <a:pPr>
+              <a:buNone/>
+            </a:pPr>
+            <a:r>
+              <a:rPr lang="en-US" sz="2800" smtClean="0"/>
+              <a:t> </a:t>
+            </a:r>
+            <a:r>
+              <a:rPr lang="en-US" sz="2800" smtClean="0"/>
+              <a:t>       </a:t>
+            </a:r>
+            <a:r>
+              <a:rPr lang="en-US" sz="2800" smtClean="0">
+                <a:hlinkClick r:id="rId2"/>
+              </a:rPr>
+              <a:t>https</a:t>
+            </a:r>
+            <a:r>
+              <a:rPr lang="en-US" sz="2800" smtClean="0">
+                <a:hlinkClick r:id="rId2"/>
+              </a:rPr>
+              <a:t>://</a:t>
+            </a:r>
+            <a:r>
+              <a:rPr lang="en-US" sz="2800" smtClean="0">
+                <a:hlinkClick r:id="rId2"/>
+              </a:rPr>
+              <a:t>gitlab.cmi.hro.nl/hojac/git_workshop_test.git</a:t>
+            </a:r>
+            <a:endParaRPr lang="en-US" sz="2800" smtClean="0"/>
+          </a:p>
+          <a:p>
+            <a:pPr>
+              <a:buNone/>
+            </a:pPr>
+            <a:endParaRPr lang="en-US" sz="2800" smtClean="0"/>
+          </a:p>
+          <a:p>
+            <a:pPr>
+              <a:buNone/>
+            </a:pPr>
+            <a:r>
+              <a:rPr lang="en-US" sz="2800" smtClean="0"/>
+              <a:t>git </a:t>
+            </a:r>
+            <a:r>
+              <a:rPr lang="en-US" sz="2800" smtClean="0"/>
+              <a:t>push -u </a:t>
+            </a:r>
+            <a:r>
+              <a:rPr lang="en-US" sz="2800" smtClean="0"/>
+              <a:t>origin </a:t>
+            </a:r>
+            <a:r>
+              <a:rPr lang="en-US" sz="2800" smtClean="0"/>
+              <a:t>–all</a:t>
+            </a:r>
+          </a:p>
+          <a:p>
+            <a:pPr>
+              <a:buNone/>
+            </a:pPr>
+            <a:endParaRPr lang="en-US" sz="2800" smtClean="0"/>
+          </a:p>
+          <a:p>
+            <a:pPr>
+              <a:buNone/>
+            </a:pPr>
+            <a:r>
+              <a:rPr lang="en-US" sz="2800" smtClean="0"/>
+              <a:t>git </a:t>
+            </a:r>
+            <a:r>
+              <a:rPr lang="en-US" sz="2800" smtClean="0"/>
+              <a:t>push -u origin --tags</a:t>
+            </a:r>
+            <a:endParaRPr lang="en-US" sz="2800"/>
+          </a:p>
+        </p:txBody>
+      </p:sp>
+    </p:spTree>
+  </p:cSld>
+  <p:clrMapOvr>
+    <a:masterClrMapping/>
+  </p:clrMapOvr>
+  <p:timing>
+    <p:tnLst>
+      <p:par>
+        <p:cTn id="1" dur="indefinite" restart="never" nodeType="tmRoot"/>
+      </p:par>
+    </p:tnLst>
+  </p:timing>
 </p:sld>
 </file>
 

</xml_diff>